<commit_message>
report2: Add preprocessing details
Signed-off-by: ReGeLePuMa <scpetrea@gmail.com>
</commit_message>
<xml_diff>
--- a/report1/Report1 2024-2025 - PETREA Andrei - Minimizarea unui Dockerfile.pptx
+++ b/report1/Report1 2024-2025 - PETREA Andrei - Minimizarea unui Dockerfile.pptx
@@ -15172,90 +15172,6 @@
   <p:clrMapOvr>
     <a:masterClrMapping/>
   </p:clrMapOvr>
-  <p:timing>
-    <p:tnLst>
-      <p:par>
-        <p:cTn id="1" dur="indefinite" restart="never" nodeType="tmRoot">
-          <p:childTnLst>
-            <p:seq concurrent="1" nextAc="seek">
-              <p:cTn id="2" dur="indefinite" nodeType="mainSeq">
-                <p:childTnLst>
-                  <p:par>
-                    <p:cTn id="3" fill="hold">
-                      <p:stCondLst>
-                        <p:cond delay="indefinite"/>
-                      </p:stCondLst>
-                      <p:childTnLst>
-                        <p:par>
-                          <p:cTn id="4" fill="hold">
-                            <p:stCondLst>
-                              <p:cond delay="0"/>
-                            </p:stCondLst>
-                            <p:childTnLst>
-                              <p:par>
-                                <p:cTn id="5" presetID="1" presetClass="entr" presetSubtype="0" fill="hold" nodeType="clickEffect" nodePh="1">
-                                  <p:stCondLst>
-                                    <p:cond delay="0"/>
-                                  </p:stCondLst>
-                                  <p:endCondLst>
-                                    <p:cond evt="begin" delay="0">
-                                      <p:tn val="5"/>
-                                    </p:cond>
-                                  </p:endCondLst>
-                                  <p:childTnLst>
-                                    <p:set>
-                                      <p:cBhvr>
-                                        <p:cTn id="6" dur="1" fill="hold">
-                                          <p:stCondLst>
-                                            <p:cond delay="0"/>
-                                          </p:stCondLst>
-                                        </p:cTn>
-                                        <p:tgtEl>
-                                          <p:spTgt spid="112">
-                                            <p:txEl>
-                                              <p:pRg st="0" end="0"/>
-                                            </p:txEl>
-                                          </p:spTgt>
-                                        </p:tgtEl>
-                                        <p:attrNameLst>
-                                          <p:attrName>style.visibility</p:attrName>
-                                        </p:attrNameLst>
-                                      </p:cBhvr>
-                                      <p:to>
-                                        <p:strVal val="visible"/>
-                                      </p:to>
-                                    </p:set>
-                                  </p:childTnLst>
-                                </p:cTn>
-                              </p:par>
-                            </p:childTnLst>
-                          </p:cTn>
-                        </p:par>
-                      </p:childTnLst>
-                    </p:cTn>
-                  </p:par>
-                </p:childTnLst>
-              </p:cTn>
-              <p:prevCondLst>
-                <p:cond evt="onPrev" delay="0">
-                  <p:tgtEl>
-                    <p:sldTgt/>
-                  </p:tgtEl>
-                </p:cond>
-              </p:prevCondLst>
-              <p:nextCondLst>
-                <p:cond evt="onNext" delay="0">
-                  <p:tgtEl>
-                    <p:sldTgt/>
-                  </p:tgtEl>
-                </p:cond>
-              </p:nextCondLst>
-            </p:seq>
-          </p:childTnLst>
-        </p:cTn>
-      </p:par>
-    </p:tnLst>
-  </p:timing>
 </p:sld>
 </file>
 

</xml_diff>